<commit_message>
update file via Desktop
</commit_message>
<xml_diff>
--- a/Kolloquium/Kolloquium.pptx
+++ b/Kolloquium/Kolloquium.pptx
@@ -223,7 +223,7 @@
           <a:p>
             <a:fld id="{F4DF2165-45DD-4E6A-8D88-991CFCF20576}" type="datetimeFigureOut">
               <a:rPr lang="de-DE" smtClean="0"/>
-              <a:t>22.02.23</a:t>
+              <a:t>22.02.2023</a:t>
             </a:fld>
             <a:endParaRPr lang="de-DE" dirty="0"/>
           </a:p>
@@ -388,7 +388,7 @@
           <a:p>
             <a:fld id="{DBB2A775-C49D-45BA-A919-7D687A0440E7}" type="datetimeFigureOut">
               <a:rPr lang="de-DE" smtClean="0"/>
-              <a:t>22.02.23</a:t>
+              <a:t>22.02.2023</a:t>
             </a:fld>
             <a:endParaRPr lang="de-DE"/>
           </a:p>
@@ -4727,14 +4727,7 @@
           <a:p>
             <a:r>
               <a:rPr lang="de" dirty="0"/>
-              <a:t>Untersuchung des Einflusses von Ausreißern auf die Prognosegenauigkeit von</a:t>
-            </a:r>
-            <a:br>
-              <a:rPr lang="de" dirty="0"/>
-            </a:br>
-            <a:r>
-              <a:rPr lang="de" dirty="0"/>
-              <a:t>Feinstaubkonzentrationen</a:t>
+              <a:t>Untersuchung des Einflusses von Ausreißern auf die Prognosegenauigkeit von Feinstaubkonzentrationen</a:t>
             </a:r>
             <a:endParaRPr lang="de-DE" dirty="0"/>
           </a:p>
@@ -7224,7 +7217,7 @@
           <p:nvPr/>
         </p:nvPicPr>
         <p:blipFill>
-          <a:blip r:embed="rId2">
+          <a:blip r:embed="rId2" cstate="print">
             <a:extLst>
               <a:ext uri="{28A0092B-C50C-407E-A947-70E740481C1C}">
                 <a14:useLocalDpi xmlns:a14="http://schemas.microsoft.com/office/drawing/2010/main" val="0"/>
@@ -7296,7 +7289,7 @@
           <p:nvPr/>
         </p:nvPicPr>
         <p:blipFill>
-          <a:blip r:embed="rId4">
+          <a:blip r:embed="rId4" cstate="print">
             <a:extLst>
               <a:ext uri="{28A0092B-C50C-407E-A947-70E740481C1C}">
                 <a14:useLocalDpi xmlns:a14="http://schemas.microsoft.com/office/drawing/2010/main" val="0"/>
@@ -7332,7 +7325,7 @@
           <p:nvPr/>
         </p:nvPicPr>
         <p:blipFill>
-          <a:blip r:embed="rId5">
+          <a:blip r:embed="rId5" cstate="print">
             <a:extLst>
               <a:ext uri="{28A0092B-C50C-407E-A947-70E740481C1C}">
                 <a14:useLocalDpi xmlns:a14="http://schemas.microsoft.com/office/drawing/2010/main" val="0"/>
@@ -7368,7 +7361,7 @@
           <p:nvPr/>
         </p:nvPicPr>
         <p:blipFill>
-          <a:blip r:embed="rId6">
+          <a:blip r:embed="rId6" cstate="print">
             <a:extLst>
               <a:ext uri="{28A0092B-C50C-407E-A947-70E740481C1C}">
                 <a14:useLocalDpi xmlns:a14="http://schemas.microsoft.com/office/drawing/2010/main" val="0"/>
@@ -11577,16 +11570,56 @@
             <p:ph type="title"/>
           </p:nvPr>
         </p:nvSpPr>
-        <p:spPr/>
+        <p:spPr>
+          <a:xfrm>
+            <a:off x="792000" y="2008907"/>
+            <a:ext cx="7560000" cy="2045983"/>
+          </a:xfrm>
+        </p:spPr>
         <p:txBody>
           <a:bodyPr/>
           <a:lstStyle/>
           <a:p>
             <a:r>
-              <a:rPr lang="de-DE" altLang="ko-KR" dirty="0"/>
-              <a:t>1</a:t>
-            </a:r>
-            <a:endParaRPr lang="de-DE" noProof="0" dirty="0"/>
+              <a:rPr lang="de-DE" altLang="ko-KR" sz="2000" dirty="0"/>
+              <a:t>1. Einleitung</a:t>
+            </a:r>
+            <a:br>
+              <a:rPr lang="de-DE" altLang="ko-KR" sz="2000" dirty="0"/>
+            </a:br>
+            <a:r>
+              <a:rPr lang="de-DE" altLang="ko-KR" sz="2000" dirty="0"/>
+              <a:t>2. Vorbetrachtungen</a:t>
+            </a:r>
+            <a:br>
+              <a:rPr lang="de-DE" altLang="ko-KR" sz="2000" dirty="0"/>
+            </a:br>
+            <a:r>
+              <a:rPr lang="de-DE" altLang="ko-KR" sz="2000" dirty="0"/>
+              <a:t>3. Literaturüberblick</a:t>
+            </a:r>
+            <a:br>
+              <a:rPr lang="de-DE" altLang="ko-KR" sz="2000" dirty="0"/>
+            </a:br>
+            <a:r>
+              <a:rPr lang="de-DE" altLang="ko-KR" sz="2000" dirty="0"/>
+              <a:t>4. Methoden</a:t>
+            </a:r>
+            <a:br>
+              <a:rPr lang="de-DE" altLang="ko-KR" sz="2000" dirty="0"/>
+            </a:br>
+            <a:r>
+              <a:rPr lang="de-DE" altLang="ko-KR" sz="2000" dirty="0"/>
+              <a:t>5. Ergebnisse &amp; Diskussion</a:t>
+            </a:r>
+            <a:br>
+              <a:rPr lang="de-DE" altLang="ko-KR" sz="2000" dirty="0"/>
+            </a:br>
+            <a:r>
+              <a:rPr lang="de-DE" altLang="ko-KR" sz="2000" dirty="0"/>
+              <a:t>6. Fazit &amp; Ausblick</a:t>
+            </a:r>
+            <a:endParaRPr lang="de-DE" sz="2000" noProof="0" dirty="0"/>
           </a:p>
         </p:txBody>
       </p:sp>
@@ -13471,7 +13504,7 @@
         <p:spPr>
           <a:xfrm>
             <a:off x="180000" y="254870"/>
-            <a:ext cx="3947157" cy="432000"/>
+            <a:ext cx="4248000" cy="432000"/>
           </a:xfrm>
         </p:spPr>
         <p:txBody>
@@ -13495,7 +13528,12 @@
             <p:ph idx="1"/>
           </p:nvPr>
         </p:nvSpPr>
-        <p:spPr/>
+        <p:spPr>
+          <a:xfrm>
+            <a:off x="180000" y="918992"/>
+            <a:ext cx="4248000" cy="3780000"/>
+          </a:xfrm>
+        </p:spPr>
         <p:txBody>
           <a:bodyPr/>
           <a:lstStyle/>
@@ -13513,124 +13551,58 @@
               <a:buNone/>
             </a:pPr>
             <a:r>
-              <a:rPr lang="de-DE" noProof="0" dirty="0">
+              <a:rPr lang="de-DE" dirty="0">
                 <a:solidFill>
                   <a:schemeClr val="tx1"/>
                 </a:solidFill>
               </a:rPr>
-              <a:t>IT Möglichkeiten und Business-Anforderung</a:t>
-            </a:r>
-          </a:p>
-          <a:p>
-            <a:pPr lvl="1">
-              <a:lnSpc>
-                <a:spcPct val="100000"/>
-              </a:lnSpc>
-            </a:pPr>
-            <a:r>
-              <a:rPr lang="de-DE" noProof="0" dirty="0">
-                <a:solidFill>
-                  <a:schemeClr val="tx1"/>
-                </a:solidFill>
-              </a:rPr>
-              <a:t>Datenmenge Westeuropa: 538 </a:t>
-            </a:r>
-            <a:r>
-              <a:rPr lang="de-DE" noProof="0" dirty="0" err="1">
-                <a:solidFill>
-                  <a:schemeClr val="tx1"/>
-                </a:solidFill>
-              </a:rPr>
-              <a:t>Exabyte</a:t>
-            </a:r>
-            <a:r>
-              <a:rPr lang="de-DE" noProof="0" dirty="0">
-                <a:solidFill>
-                  <a:schemeClr val="tx1"/>
-                </a:solidFill>
-              </a:rPr>
-              <a:t> in 2012</a:t>
-            </a:r>
-          </a:p>
-          <a:p>
-            <a:pPr lvl="1">
-              <a:lnSpc>
-                <a:spcPct val="100000"/>
-              </a:lnSpc>
-            </a:pPr>
-            <a:r>
-              <a:rPr lang="de-DE" noProof="0" dirty="0">
-                <a:solidFill>
-                  <a:schemeClr val="tx1"/>
-                </a:solidFill>
-              </a:rPr>
-              <a:t>Jährliches Wachstum um 30% auf 5 </a:t>
-            </a:r>
-            <a:r>
-              <a:rPr lang="de-DE" noProof="0" dirty="0" err="1">
-                <a:solidFill>
-                  <a:schemeClr val="tx1"/>
-                </a:solidFill>
-              </a:rPr>
-              <a:t>Zettabyte</a:t>
-            </a:r>
-            <a:r>
-              <a:rPr lang="de-DE" noProof="0" dirty="0">
-                <a:solidFill>
-                  <a:schemeClr val="tx1"/>
-                </a:solidFill>
-              </a:rPr>
-              <a:t> </a:t>
-            </a:r>
-            <a:br>
-              <a:rPr lang="de-DE" noProof="0" dirty="0">
-                <a:solidFill>
-                  <a:schemeClr val="tx1"/>
-                </a:solidFill>
-              </a:rPr>
-            </a:br>
-            <a:r>
-              <a:rPr lang="de-DE" noProof="0" dirty="0">
-                <a:solidFill>
-                  <a:schemeClr val="tx1"/>
-                </a:solidFill>
-              </a:rPr>
-              <a:t>in 2020 [IDC]</a:t>
+              <a:t>Bedarf von BigData erhöht sich, Low-Cost-Sensor, UmweltMessen kommt häufig Ausreißer</a:t>
             </a:r>
           </a:p>
           <a:p>
             <a:pPr marL="81000" indent="0">
               <a:buNone/>
             </a:pPr>
+            <a:endParaRPr lang="de-DE" altLang="ko-KR" dirty="0">
+              <a:solidFill>
+                <a:schemeClr val="tx1"/>
+              </a:solidFill>
+            </a:endParaRPr>
+          </a:p>
+          <a:p>
+            <a:pPr marL="81000" indent="0">
+              <a:buNone/>
+            </a:pPr>
             <a:r>
               <a:rPr lang="de-DE" altLang="ko-KR" dirty="0"/>
               <a:t>Warum wichtig</a:t>
             </a:r>
           </a:p>
           <a:p>
-            <a:pPr lvl="1">
-              <a:lnSpc>
-                <a:spcPct val="100000"/>
-              </a:lnSpc>
+            <a:pPr marL="81000" indent="0">
+              <a:buNone/>
             </a:pPr>
             <a:r>
-              <a:rPr lang="de-DE" noProof="0" dirty="0"/>
-              <a:t>Vielzahl heterogener Systeme und Anwendungen </a:t>
-            </a:r>
-          </a:p>
-          <a:p>
-            <a:pPr lvl="1">
-              <a:lnSpc>
-                <a:spcPct val="100000"/>
-              </a:lnSpc>
+              <a:rPr lang="de-DE" altLang="ko-KR" dirty="0">
+                <a:solidFill>
+                  <a:schemeClr val="tx1"/>
+                </a:solidFill>
+              </a:rPr>
+              <a:t>Umwelt und Zeitreihen wichtig</a:t>
+            </a:r>
+          </a:p>
+          <a:p>
+            <a:pPr marL="81000" indent="0">
+              <a:buNone/>
             </a:pPr>
             <a:r>
-              <a:rPr lang="de-DE" noProof="0" dirty="0"/>
-              <a:t>Technische und organisatorische Gründe</a:t>
-            </a:r>
-          </a:p>
-          <a:p>
-            <a:pPr lvl="1"/>
+              <a:rPr lang="de-DE" altLang="ko-KR" dirty="0">
+                <a:solidFill>
+                  <a:schemeClr val="tx1"/>
+                </a:solidFill>
+              </a:rPr>
+              <a:t>(Abbildung in der Arbeit)</a:t>
+            </a:r>
             <a:endParaRPr lang="de-DE" noProof="0" dirty="0"/>
           </a:p>
           <a:p>
@@ -13669,97 +13641,8 @@
             </a:pPr>
             <a:r>
               <a:rPr lang="de-DE" dirty="0"/>
-              <a:t>“</a:t>
-            </a:r>
-            <a:r>
-              <a:rPr lang="de-DE" dirty="0" err="1"/>
-              <a:t>Application</a:t>
-            </a:r>
-            <a:r>
-              <a:rPr lang="de-DE" dirty="0"/>
-              <a:t> </a:t>
-            </a:r>
-            <a:r>
-              <a:rPr lang="de-DE" dirty="0" err="1"/>
-              <a:t>infrastructure</a:t>
-            </a:r>
-            <a:r>
-              <a:rPr lang="de-DE" dirty="0"/>
-              <a:t> </a:t>
-            </a:r>
-            <a:r>
-              <a:rPr lang="de-DE" dirty="0" err="1"/>
-              <a:t>and</a:t>
-            </a:r>
-            <a:r>
-              <a:rPr lang="de-DE" dirty="0"/>
-              <a:t> </a:t>
-            </a:r>
-            <a:r>
-              <a:rPr lang="de-DE" dirty="0" err="1"/>
-              <a:t>middleware</a:t>
-            </a:r>
-            <a:r>
-              <a:rPr lang="de-DE" dirty="0"/>
-              <a:t> </a:t>
-            </a:r>
-            <a:r>
-              <a:rPr lang="de-DE" dirty="0" err="1"/>
-              <a:t>market</a:t>
-            </a:r>
-            <a:r>
-              <a:rPr lang="de-DE" dirty="0"/>
-              <a:t>” wuchs um </a:t>
-            </a:r>
-            <a:r>
-              <a:rPr lang="de-DE" b="1" dirty="0"/>
-              <a:t>6.9% von 14.17 Mrd. USD in 2007 auf 15.15 </a:t>
-            </a:r>
-            <a:r>
-              <a:rPr lang="de-DE" b="1" dirty="0" err="1"/>
-              <a:t>Mrd</a:t>
-            </a:r>
-            <a:r>
-              <a:rPr lang="de-DE" b="1" dirty="0"/>
-              <a:t> USD in 2008</a:t>
-            </a:r>
-          </a:p>
-          <a:p>
-            <a:pPr lvl="1">
-              <a:lnSpc>
-                <a:spcPct val="100000"/>
-              </a:lnSpc>
-            </a:pPr>
-            <a:endParaRPr lang="de-DE" b="1" dirty="0"/>
-          </a:p>
-          <a:p>
-            <a:pPr lvl="1">
-              <a:lnSpc>
-                <a:spcPct val="100000"/>
-              </a:lnSpc>
-            </a:pPr>
-            <a:r>
-              <a:rPr lang="de-DE" dirty="0"/>
-              <a:t>Integration ist eine der größten und teuersten Herausforderungen von IT-Firmen</a:t>
-            </a:r>
-            <a:br>
-              <a:rPr lang="de-DE" dirty="0"/>
-            </a:br>
-            <a:r>
-              <a:rPr lang="de-DE" dirty="0"/>
-              <a:t>(</a:t>
-            </a:r>
-            <a:r>
-              <a:rPr lang="de-DE" b="1" dirty="0"/>
-              <a:t>40% </a:t>
-            </a:r>
-            <a:r>
-              <a:rPr lang="de-DE" dirty="0"/>
-              <a:t>des Budgets wird für Integrationssoftware und Integrationsprojekte ausgegeben)</a:t>
-            </a:r>
-          </a:p>
-          <a:p>
-            <a:endParaRPr lang="de-DE" dirty="0"/>
+              <a:t>...</a:t>
+            </a:r>
           </a:p>
         </p:txBody>
       </p:sp>
@@ -13773,147 +13656,6 @@
   <p:clrMapOvr>
     <a:masterClrMapping/>
   </p:clrMapOvr>
-  <p:timing>
-    <p:tnLst>
-      <p:par>
-        <p:cTn id="1" dur="indefinite" restart="never" nodeType="tmRoot">
-          <p:childTnLst>
-            <p:seq concurrent="1" nextAc="seek">
-              <p:cTn id="2" dur="indefinite" nodeType="mainSeq">
-                <p:childTnLst>
-                  <p:par>
-                    <p:cTn id="3" fill="hold">
-                      <p:stCondLst>
-                        <p:cond delay="indefinite"/>
-                      </p:stCondLst>
-                      <p:childTnLst>
-                        <p:par>
-                          <p:cTn id="4" fill="hold">
-                            <p:stCondLst>
-                              <p:cond delay="0"/>
-                            </p:stCondLst>
-                            <p:childTnLst>
-                              <p:par>
-                                <p:cTn id="5" presetID="1" presetClass="entr" presetSubtype="0" fill="hold" nodeType="clickEffect">
-                                  <p:stCondLst>
-                                    <p:cond delay="0"/>
-                                  </p:stCondLst>
-                                  <p:childTnLst>
-                                    <p:set>
-                                      <p:cBhvr>
-                                        <p:cTn id="6" dur="1" fill="hold">
-                                          <p:stCondLst>
-                                            <p:cond delay="0"/>
-                                          </p:stCondLst>
-                                        </p:cTn>
-                                        <p:tgtEl>
-                                          <p:spTgt spid="3">
-                                            <p:txEl>
-                                              <p:pRg st="4" end="4"/>
-                                            </p:txEl>
-                                          </p:spTgt>
-                                        </p:tgtEl>
-                                        <p:attrNameLst>
-                                          <p:attrName>style.visibility</p:attrName>
-                                        </p:attrNameLst>
-                                      </p:cBhvr>
-                                      <p:to>
-                                        <p:strVal val="visible"/>
-                                      </p:to>
-                                    </p:set>
-                                  </p:childTnLst>
-                                </p:cTn>
-                              </p:par>
-                              <p:par>
-                                <p:cTn id="7" presetID="1" presetClass="entr" presetSubtype="0" fill="hold" nodeType="withEffect">
-                                  <p:stCondLst>
-                                    <p:cond delay="0"/>
-                                  </p:stCondLst>
-                                  <p:childTnLst>
-                                    <p:set>
-                                      <p:cBhvr>
-                                        <p:cTn id="8" dur="1" fill="hold">
-                                          <p:stCondLst>
-                                            <p:cond delay="0"/>
-                                          </p:stCondLst>
-                                        </p:cTn>
-                                        <p:tgtEl>
-                                          <p:spTgt spid="3">
-                                            <p:txEl>
-                                              <p:pRg st="5" end="5"/>
-                                            </p:txEl>
-                                          </p:spTgt>
-                                        </p:tgtEl>
-                                        <p:attrNameLst>
-                                          <p:attrName>style.visibility</p:attrName>
-                                        </p:attrNameLst>
-                                      </p:cBhvr>
-                                      <p:to>
-                                        <p:strVal val="visible"/>
-                                      </p:to>
-                                    </p:set>
-                                  </p:childTnLst>
-                                </p:cTn>
-                              </p:par>
-                              <p:par>
-                                <p:cTn id="9" presetID="1" presetClass="entr" presetSubtype="0" fill="hold" nodeType="withEffect">
-                                  <p:stCondLst>
-                                    <p:cond delay="0"/>
-                                  </p:stCondLst>
-                                  <p:childTnLst>
-                                    <p:set>
-                                      <p:cBhvr>
-                                        <p:cTn id="10" dur="1" fill="hold">
-                                          <p:stCondLst>
-                                            <p:cond delay="0"/>
-                                          </p:stCondLst>
-                                        </p:cTn>
-                                        <p:tgtEl>
-                                          <p:spTgt spid="3">
-                                            <p:txEl>
-                                              <p:pRg st="6" end="6"/>
-                                            </p:txEl>
-                                          </p:spTgt>
-                                        </p:tgtEl>
-                                        <p:attrNameLst>
-                                          <p:attrName>style.visibility</p:attrName>
-                                        </p:attrNameLst>
-                                      </p:cBhvr>
-                                      <p:to>
-                                        <p:strVal val="visible"/>
-                                      </p:to>
-                                    </p:set>
-                                  </p:childTnLst>
-                                </p:cTn>
-                              </p:par>
-                            </p:childTnLst>
-                          </p:cTn>
-                        </p:par>
-                      </p:childTnLst>
-                    </p:cTn>
-                  </p:par>
-                </p:childTnLst>
-              </p:cTn>
-              <p:prevCondLst>
-                <p:cond evt="onPrev" delay="0">
-                  <p:tgtEl>
-                    <p:sldTgt/>
-                  </p:tgtEl>
-                </p:cond>
-              </p:prevCondLst>
-              <p:nextCondLst>
-                <p:cond evt="onNext" delay="0">
-                  <p:tgtEl>
-                    <p:sldTgt/>
-                  </p:tgtEl>
-                </p:cond>
-              </p:nextCondLst>
-            </p:seq>
-          </p:childTnLst>
-        </p:cTn>
-      </p:par>
-    </p:tnLst>
-  </p:timing>
 </p:sld>
 </file>
 
@@ -13951,7 +13693,11 @@
           <a:p>
             <a:r>
               <a:rPr lang="de-DE" altLang="ko-KR" dirty="0"/>
-              <a:t>2. Grundlagen</a:t>
+              <a:t>2. </a:t>
+            </a:r>
+            <a:r>
+              <a:rPr lang="de-DE" altLang="ko-KR" sz="2400" dirty="0"/>
+              <a:t>Vorbetrachtungen</a:t>
             </a:r>
             <a:endParaRPr lang="de-DE" noProof="0" dirty="0"/>
           </a:p>
@@ -14017,6 +13763,89 @@
               <a:rPr lang="de-DE" noProof="0" dirty="0"/>
               <a:t>Motivation Datenintegration</a:t>
             </a:r>
+          </a:p>
+        </p:txBody>
+      </p:sp>
+      <p:sp>
+        <p:nvSpPr>
+          <p:cNvPr id="2" name="TextBox 1">
+            <a:extLst>
+              <a:ext uri="{FF2B5EF4-FFF2-40B4-BE49-F238E27FC236}">
+                <a16:creationId xmlns:a16="http://schemas.microsoft.com/office/drawing/2014/main" id="{52CBE89B-6D14-FF08-D693-7FA8A6E15562}"/>
+              </a:ext>
+            </a:extLst>
+          </p:cNvPr>
+          <p:cNvSpPr txBox="1"/>
+          <p:nvPr/>
+        </p:nvSpPr>
+        <p:spPr>
+          <a:xfrm>
+            <a:off x="548640" y="1556087"/>
+            <a:ext cx="1930337" cy="1015663"/>
+          </a:xfrm>
+          <a:prstGeom prst="rect">
+            <a:avLst/>
+          </a:prstGeom>
+          <a:noFill/>
+        </p:spPr>
+        <p:txBody>
+          <a:bodyPr wrap="none" rtlCol="0">
+            <a:spAutoFit/>
+          </a:bodyPr>
+          <a:lstStyle/>
+          <a:p>
+            <a:pPr algn="l"/>
+            <a:r>
+              <a:rPr lang="de-DE" altLang="ko-KR" sz="1200" dirty="0">
+                <a:latin typeface="Open Sans" panose="020B0606030504020204" pitchFamily="34" charset="0"/>
+                <a:ea typeface="Open Sans" panose="020B0606030504020204" pitchFamily="34" charset="0"/>
+                <a:cs typeface="Open Sans" panose="020B0606030504020204" pitchFamily="34" charset="0"/>
+              </a:rPr>
+              <a:t>Anomalie</a:t>
+            </a:r>
+          </a:p>
+          <a:p>
+            <a:pPr algn="l"/>
+            <a:endParaRPr lang="de-DE" altLang="ko-KR" sz="1200" dirty="0">
+              <a:latin typeface="Open Sans" panose="020B0606030504020204" pitchFamily="34" charset="0"/>
+              <a:ea typeface="Open Sans" panose="020B0606030504020204" pitchFamily="34" charset="0"/>
+              <a:cs typeface="Open Sans" panose="020B0606030504020204" pitchFamily="34" charset="0"/>
+            </a:endParaRPr>
+          </a:p>
+          <a:p>
+            <a:pPr algn="l"/>
+            <a:r>
+              <a:rPr lang="de-DE" altLang="ko-KR" sz="1200" dirty="0">
+                <a:latin typeface="Open Sans" panose="020B0606030504020204" pitchFamily="34" charset="0"/>
+                <a:ea typeface="Open Sans" panose="020B0606030504020204" pitchFamily="34" charset="0"/>
+                <a:cs typeface="Open Sans" panose="020B0606030504020204" pitchFamily="34" charset="0"/>
+              </a:rPr>
+              <a:t>Zeitreihen</a:t>
+            </a:r>
+          </a:p>
+          <a:p>
+            <a:pPr algn="l"/>
+            <a:endParaRPr lang="de-DE" altLang="ko-KR" sz="1200" dirty="0">
+              <a:latin typeface="Open Sans" panose="020B0606030504020204" pitchFamily="34" charset="0"/>
+              <a:ea typeface="Open Sans" panose="020B0606030504020204" pitchFamily="34" charset="0"/>
+              <a:cs typeface="Open Sans" panose="020B0606030504020204" pitchFamily="34" charset="0"/>
+            </a:endParaRPr>
+          </a:p>
+          <a:p>
+            <a:pPr algn="l"/>
+            <a:r>
+              <a:rPr lang="de-DE" altLang="ko-KR" sz="1200" dirty="0">
+                <a:latin typeface="Open Sans" panose="020B0606030504020204" pitchFamily="34" charset="0"/>
+                <a:ea typeface="Open Sans" panose="020B0606030504020204" pitchFamily="34" charset="0"/>
+                <a:cs typeface="Open Sans" panose="020B0606030504020204" pitchFamily="34" charset="0"/>
+              </a:rPr>
+              <a:t>Modellierung der Feinst.</a:t>
+            </a:r>
+            <a:endParaRPr lang="ko-KR" altLang="en-US" sz="1200" dirty="0" err="1">
+              <a:latin typeface="Open Sans" panose="020B0606030504020204" pitchFamily="34" charset="0"/>
+              <a:ea typeface="Open Sans" panose="020B0606030504020204" pitchFamily="34" charset="0"/>
+              <a:cs typeface="Open Sans" panose="020B0606030504020204" pitchFamily="34" charset="0"/>
+            </a:endParaRPr>
           </a:p>
         </p:txBody>
       </p:sp>

</xml_diff>